<commit_message>
Final fixes and repare for presentation
</commit_message>
<xml_diff>
--- a/docs/Романюк Богдан ПМі-53.pptx
+++ b/docs/Романюк Богдан ПМі-53.pptx
@@ -21,7 +21,10 @@
     <p:sldId id="268" r:id="rId15"/>
     <p:sldId id="269" r:id="rId16"/>
     <p:sldId id="270" r:id="rId17"/>
-    <p:sldId id="271" r:id="rId18"/>
+    <p:sldId id="274" r:id="rId18"/>
+    <p:sldId id="275" r:id="rId19"/>
+    <p:sldId id="273" r:id="rId20"/>
+    <p:sldId id="271" r:id="rId21"/>
   </p:sldIdLst>
   <p:sldSz cx="9144000" cy="5143500" type="screen16x9"/>
   <p:notesSz cx="6858000" cy="9144000"/>
@@ -304,7 +307,7 @@
           <a:p>
             <a:fld id="{C90A66AE-81F5-474A-B74B-EE41E9320F19}" type="datetimeFigureOut">
               <a:rPr lang="uk-UA" smtClean="0"/>
-              <a:t>24.05.2020</a:t>
+              <a:t>31.05.2020</a:t>
             </a:fld>
             <a:endParaRPr lang="uk-UA"/>
           </a:p>
@@ -469,7 +472,7 @@
           <a:p>
             <a:fld id="{C90A66AE-81F5-474A-B74B-EE41E9320F19}" type="datetimeFigureOut">
               <a:rPr lang="uk-UA" smtClean="0"/>
-              <a:t>24.05.2020</a:t>
+              <a:t>31.05.2020</a:t>
             </a:fld>
             <a:endParaRPr lang="uk-UA"/>
           </a:p>
@@ -644,7 +647,7 @@
           <a:p>
             <a:fld id="{C90A66AE-81F5-474A-B74B-EE41E9320F19}" type="datetimeFigureOut">
               <a:rPr lang="uk-UA" smtClean="0"/>
-              <a:t>24.05.2020</a:t>
+              <a:t>31.05.2020</a:t>
             </a:fld>
             <a:endParaRPr lang="uk-UA"/>
           </a:p>
@@ -809,7 +812,7 @@
           <a:p>
             <a:fld id="{C90A66AE-81F5-474A-B74B-EE41E9320F19}" type="datetimeFigureOut">
               <a:rPr lang="uk-UA" smtClean="0"/>
-              <a:t>24.05.2020</a:t>
+              <a:t>31.05.2020</a:t>
             </a:fld>
             <a:endParaRPr lang="uk-UA"/>
           </a:p>
@@ -1050,7 +1053,7 @@
           <a:p>
             <a:fld id="{C90A66AE-81F5-474A-B74B-EE41E9320F19}" type="datetimeFigureOut">
               <a:rPr lang="uk-UA" smtClean="0"/>
-              <a:t>24.05.2020</a:t>
+              <a:t>31.05.2020</a:t>
             </a:fld>
             <a:endParaRPr lang="uk-UA"/>
           </a:p>
@@ -1333,7 +1336,7 @@
           <a:p>
             <a:fld id="{C90A66AE-81F5-474A-B74B-EE41E9320F19}" type="datetimeFigureOut">
               <a:rPr lang="uk-UA" smtClean="0"/>
-              <a:t>24.05.2020</a:t>
+              <a:t>31.05.2020</a:t>
             </a:fld>
             <a:endParaRPr lang="uk-UA"/>
           </a:p>
@@ -1750,7 +1753,7 @@
           <a:p>
             <a:fld id="{C90A66AE-81F5-474A-B74B-EE41E9320F19}" type="datetimeFigureOut">
               <a:rPr lang="uk-UA" smtClean="0"/>
-              <a:t>24.05.2020</a:t>
+              <a:t>31.05.2020</a:t>
             </a:fld>
             <a:endParaRPr lang="uk-UA"/>
           </a:p>
@@ -1863,7 +1866,7 @@
           <a:p>
             <a:fld id="{C90A66AE-81F5-474A-B74B-EE41E9320F19}" type="datetimeFigureOut">
               <a:rPr lang="uk-UA" smtClean="0"/>
-              <a:t>24.05.2020</a:t>
+              <a:t>31.05.2020</a:t>
             </a:fld>
             <a:endParaRPr lang="uk-UA"/>
           </a:p>
@@ -1953,7 +1956,7 @@
           <a:p>
             <a:fld id="{C90A66AE-81F5-474A-B74B-EE41E9320F19}" type="datetimeFigureOut">
               <a:rPr lang="uk-UA" smtClean="0"/>
-              <a:t>24.05.2020</a:t>
+              <a:t>31.05.2020</a:t>
             </a:fld>
             <a:endParaRPr lang="uk-UA"/>
           </a:p>
@@ -2225,7 +2228,7 @@
           <a:p>
             <a:fld id="{C90A66AE-81F5-474A-B74B-EE41E9320F19}" type="datetimeFigureOut">
               <a:rPr lang="uk-UA" smtClean="0"/>
-              <a:t>24.05.2020</a:t>
+              <a:t>31.05.2020</a:t>
             </a:fld>
             <a:endParaRPr lang="uk-UA"/>
           </a:p>
@@ -2477,7 +2480,7 @@
           <a:p>
             <a:fld id="{C90A66AE-81F5-474A-B74B-EE41E9320F19}" type="datetimeFigureOut">
               <a:rPr lang="uk-UA" smtClean="0"/>
-              <a:t>24.05.2020</a:t>
+              <a:t>31.05.2020</a:t>
             </a:fld>
             <a:endParaRPr lang="uk-UA"/>
           </a:p>
@@ -2694,7 +2697,7 @@
           <a:p>
             <a:fld id="{C90A66AE-81F5-474A-B74B-EE41E9320F19}" type="datetimeFigureOut">
               <a:rPr lang="uk-UA" smtClean="0"/>
-              <a:t>24.05.2020</a:t>
+              <a:t>31.05.2020</a:t>
             </a:fld>
             <a:endParaRPr lang="uk-UA"/>
           </a:p>
@@ -3594,7 +3597,7 @@
                 <a:ea typeface="Calibri" pitchFamily="34" charset="0"/>
                 <a:cs typeface="Times New Roman" pitchFamily="18" charset="0"/>
               </a:rPr>
-              <a:t>N=4, </a:t>
+              <a:t>N=10, </a:t>
             </a:r>
             <a:r>
               <a:rPr kumimoji="0" lang="uk-UA" sz="1400" b="0" i="0" u="none" strike="noStrike" cap="none" normalizeH="0" baseline="0" dirty="0" smtClean="0">
@@ -3624,7 +3627,7 @@
                 <a:ea typeface="Times New Roman" pitchFamily="18" charset="0"/>
                 <a:cs typeface="Times New Roman" pitchFamily="18" charset="0"/>
               </a:rPr>
-              <a:t>η=5%</a:t>
+              <a:t>η=1%</a:t>
             </a:r>
             <a:endParaRPr kumimoji="0" lang="en-US" sz="1800" b="0" i="0" u="none" strike="noStrike" cap="none" normalizeH="0" baseline="0" dirty="0" smtClean="0">
               <a:ln>
@@ -4150,28 +4153,6 @@
           </a:p>
         </p:txBody>
       </p:sp>
-      <p:pic>
-        <p:nvPicPr>
-          <p:cNvPr id="5" name="Рисунок 4"/>
-          <p:cNvPicPr/>
-          <p:nvPr/>
-        </p:nvPicPr>
-        <p:blipFill>
-          <a:blip r:embed="rId2"/>
-          <a:stretch>
-            <a:fillRect/>
-          </a:stretch>
-        </p:blipFill>
-        <p:spPr>
-          <a:xfrm>
-            <a:off x="1312670" y="339502"/>
-            <a:ext cx="6520238" cy="4320479"/>
-          </a:xfrm>
-          <a:prstGeom prst="rect">
-            <a:avLst/>
-          </a:prstGeom>
-        </p:spPr>
-      </p:pic>
       <p:sp>
         <p:nvSpPr>
           <p:cNvPr id="6" name="Прямокутник 5"/>
@@ -4181,7 +4162,7 @@
         <p:spPr>
           <a:xfrm>
             <a:off x="3761733" y="4659981"/>
-            <a:ext cx="1622111" cy="369332"/>
+            <a:ext cx="1739130" cy="369332"/>
           </a:xfrm>
           <a:prstGeom prst="rect">
             <a:avLst/>
@@ -4194,15 +4175,15 @@
           <a:lstStyle/>
           <a:p>
             <a:r>
-              <a:rPr lang="en-US" dirty="0"/>
+              <a:rPr lang="en-US" dirty="0" smtClean="0"/>
               <a:t>N=</a:t>
             </a:r>
             <a:r>
-              <a:rPr lang="uk-UA" dirty="0"/>
-              <a:t>4</a:t>
+              <a:rPr lang="uk-UA" dirty="0" smtClean="0"/>
+              <a:t>10</a:t>
             </a:r>
             <a:r>
-              <a:rPr lang="en-US" dirty="0"/>
+              <a:rPr lang="en-US" dirty="0" smtClean="0"/>
               <a:t>, </a:t>
             </a:r>
             <a:r>
@@ -4212,6 +4193,28 @@
           </a:p>
         </p:txBody>
       </p:sp>
+      <p:pic>
+        <p:nvPicPr>
+          <p:cNvPr id="8" name="Рисунок 7"/>
+          <p:cNvPicPr/>
+          <p:nvPr/>
+        </p:nvPicPr>
+        <p:blipFill>
+          <a:blip r:embed="rId2"/>
+          <a:stretch>
+            <a:fillRect/>
+          </a:stretch>
+        </p:blipFill>
+        <p:spPr>
+          <a:xfrm>
+            <a:off x="1312670" y="339503"/>
+            <a:ext cx="6520238" cy="4319658"/>
+          </a:xfrm>
+          <a:prstGeom prst="rect">
+            <a:avLst/>
+          </a:prstGeom>
+        </p:spPr>
+      </p:pic>
     </p:spTree>
     <p:extLst>
       <p:ext uri="{BB962C8B-B14F-4D97-AF65-F5344CB8AC3E}">
@@ -4312,7 +4315,7 @@
         <p:spPr>
           <a:xfrm>
             <a:off x="3761733" y="4659981"/>
-            <a:ext cx="1622111" cy="369332"/>
+            <a:ext cx="1739130" cy="369332"/>
           </a:xfrm>
           <a:prstGeom prst="rect">
             <a:avLst/>
@@ -4329,8 +4332,8 @@
               <a:t>N=</a:t>
             </a:r>
             <a:r>
-              <a:rPr lang="uk-UA" dirty="0"/>
-              <a:t>8</a:t>
+              <a:rPr lang="uk-UA" dirty="0" smtClean="0"/>
+              <a:t>27</a:t>
             </a:r>
             <a:r>
               <a:rPr lang="en-US" dirty="0" smtClean="0"/>
@@ -4341,8 +4344,8 @@
               <a:t>ітерація </a:t>
             </a:r>
             <a:r>
-              <a:rPr lang="uk-UA" dirty="0" smtClean="0"/>
-              <a:t>2</a:t>
+              <a:rPr lang="uk-UA" dirty="0"/>
+              <a:t>3</a:t>
             </a:r>
             <a:endParaRPr lang="uk-UA" dirty="0"/>
           </a:p>
@@ -4350,7 +4353,7 @@
       </p:sp>
       <p:pic>
         <p:nvPicPr>
-          <p:cNvPr id="15" name="Рисунок 14"/>
+          <p:cNvPr id="6" name="Рисунок 5"/>
           <p:cNvPicPr/>
           <p:nvPr/>
         </p:nvPicPr>
@@ -4362,8 +4365,8 @@
         </p:blipFill>
         <p:spPr>
           <a:xfrm>
-            <a:off x="1312670" y="353172"/>
-            <a:ext cx="6520238" cy="4313388"/>
+            <a:off x="1312669" y="339503"/>
+            <a:ext cx="6520239" cy="4323644"/>
           </a:xfrm>
           <a:prstGeom prst="rect">
             <a:avLst/>
@@ -4488,7 +4491,7 @@
             </a:r>
             <a:r>
               <a:rPr lang="uk-UA" dirty="0" smtClean="0"/>
-              <a:t>17</a:t>
+              <a:t>35</a:t>
             </a:r>
             <a:r>
               <a:rPr lang="en-US" dirty="0" smtClean="0"/>
@@ -4508,7 +4511,7 @@
       </p:sp>
       <p:pic>
         <p:nvPicPr>
-          <p:cNvPr id="12" name="Рисунок 11"/>
+          <p:cNvPr id="6" name="Рисунок 5"/>
           <p:cNvPicPr/>
           <p:nvPr/>
         </p:nvPicPr>
@@ -4520,8 +4523,8 @@
         </p:blipFill>
         <p:spPr>
           <a:xfrm>
-            <a:off x="1312670" y="339502"/>
-            <a:ext cx="6520238" cy="4335691"/>
+            <a:off x="1330050" y="337763"/>
+            <a:ext cx="6502858" cy="4298231"/>
           </a:xfrm>
           <a:prstGeom prst="rect">
             <a:avLst/>
@@ -4646,7 +4649,7 @@
             </a:r>
             <a:r>
               <a:rPr lang="uk-UA" dirty="0" smtClean="0"/>
-              <a:t>33</a:t>
+              <a:t>46</a:t>
             </a:r>
             <a:r>
               <a:rPr lang="en-US" dirty="0" smtClean="0"/>
@@ -4657,8 +4660,8 @@
               <a:t>ітерація </a:t>
             </a:r>
             <a:r>
-              <a:rPr lang="uk-UA" dirty="0" smtClean="0"/>
-              <a:t>6</a:t>
+              <a:rPr lang="uk-UA" dirty="0"/>
+              <a:t>5</a:t>
             </a:r>
             <a:endParaRPr lang="uk-UA" dirty="0"/>
           </a:p>
@@ -4666,7 +4669,7 @@
       </p:sp>
       <p:pic>
         <p:nvPicPr>
-          <p:cNvPr id="6" name="Рисунок 5"/>
+          <p:cNvPr id="7" name="Рисунок 6"/>
           <p:cNvPicPr/>
           <p:nvPr/>
         </p:nvPicPr>
@@ -4678,8 +4681,8 @@
         </p:blipFill>
         <p:spPr>
           <a:xfrm>
-            <a:off x="1312670" y="339502"/>
-            <a:ext cx="6520238" cy="4330835"/>
+            <a:off x="1312670" y="339503"/>
+            <a:ext cx="6520238" cy="4336152"/>
           </a:xfrm>
           <a:prstGeom prst="rect">
             <a:avLst/>
@@ -4944,7 +4947,7 @@
         <p:spPr>
           <a:xfrm>
             <a:off x="3761733" y="4659981"/>
-            <a:ext cx="1973169" cy="369332"/>
+            <a:ext cx="1739130" cy="369332"/>
           </a:xfrm>
           <a:prstGeom prst="rect">
             <a:avLst/>
@@ -4962,10 +4965,10 @@
             </a:r>
             <a:r>
               <a:rPr lang="uk-UA" dirty="0" smtClean="0"/>
-              <a:t>104</a:t>
+              <a:t>71</a:t>
             </a:r>
             <a:r>
-              <a:rPr lang="en-US" dirty="0"/>
+              <a:rPr lang="en-US" dirty="0" smtClean="0"/>
               <a:t>, </a:t>
             </a:r>
             <a:r>
@@ -4974,7 +4977,7 @@
             </a:r>
             <a:r>
               <a:rPr lang="uk-UA" dirty="0" smtClean="0"/>
-              <a:t>16</a:t>
+              <a:t>7</a:t>
             </a:r>
             <a:endParaRPr lang="uk-UA" dirty="0"/>
           </a:p>
@@ -4982,7 +4985,7 @@
       </p:sp>
       <p:pic>
         <p:nvPicPr>
-          <p:cNvPr id="6" name="Рисунок 5"/>
+          <p:cNvPr id="8" name="Рисунок 7"/>
           <p:cNvPicPr/>
           <p:nvPr/>
         </p:nvPicPr>
@@ -4994,8 +4997,8 @@
         </p:blipFill>
         <p:spPr>
           <a:xfrm>
-            <a:off x="1312670" y="331252"/>
-            <a:ext cx="6520238" cy="4345934"/>
+            <a:off x="1312670" y="339503"/>
+            <a:ext cx="6520238" cy="4358202"/>
           </a:xfrm>
           <a:prstGeom prst="rect">
             <a:avLst/>
@@ -5083,7 +5086,7 @@
                   <a:srgbClr val="009999"/>
                 </a:solidFill>
               </a:rPr>
-              <a:t>Висновки</a:t>
+              <a:t>Аналіз результатів</a:t>
             </a:r>
             <a:endParaRPr lang="uk-UA" sz="2400" b="1" dirty="0">
               <a:solidFill>
@@ -5101,89 +5104,340 @@
         </p:nvSpPr>
         <p:spPr>
           <a:xfrm>
-            <a:off x="447997" y="483518"/>
-            <a:ext cx="8219256" cy="4247317"/>
+            <a:off x="3761733" y="4659981"/>
+            <a:ext cx="1973169" cy="369332"/>
           </a:xfrm>
           <a:prstGeom prst="rect">
             <a:avLst/>
           </a:prstGeom>
         </p:spPr>
         <p:txBody>
-          <a:bodyPr wrap="square">
+          <a:bodyPr wrap="none">
             <a:spAutoFit/>
           </a:bodyPr>
           <a:lstStyle/>
           <a:p>
             <a:r>
+              <a:rPr lang="en-US" dirty="0" smtClean="0"/>
+              <a:t>N=</a:t>
+            </a:r>
+            <a:r>
               <a:rPr lang="uk-UA" dirty="0" smtClean="0"/>
-              <a:t>	Як можна бачити з </a:t>
+              <a:t>183</a:t>
+            </a:r>
+            <a:r>
+              <a:rPr lang="en-US" dirty="0" smtClean="0"/>
+              <a:t>, </a:t>
             </a:r>
             <a:r>
               <a:rPr lang="uk-UA" dirty="0"/>
-              <a:t>використанням методу скінченних елементів можна досить швидко і просто отримати розв’язок стаціонарної крайової задачі конвекції-дифузії-реакції. </a:t>
-            </a:r>
-          </a:p>
-          <a:p>
-            <a:r>
-              <a:rPr lang="uk-UA" dirty="0"/>
-              <a:t>	Таким чином застосувавши </a:t>
+              <a:t>ітерація </a:t>
             </a:r>
             <a:r>
               <a:rPr lang="uk-UA" dirty="0" smtClean="0"/>
-              <a:t>метод Гальоркіна </a:t>
+              <a:t>14</a:t>
             </a:r>
-            <a:r>
-              <a:rPr lang="uk-UA" dirty="0"/>
-              <a:t>та з допомогою кусково-лінійний функції Куранта вдалося побудувати наближеним розв’язок даної задачі. При цьому використовуючи </a:t>
-            </a:r>
-            <a:r>
-              <a:rPr lang="en-US" dirty="0"/>
-              <a:t>h-</a:t>
-            </a:r>
-            <a:r>
-              <a:rPr lang="uk-UA" dirty="0"/>
-              <a:t>адаптивну схему можна досить швидко та з великою точність знайти наближений розв’язок задачі. Такий підхід дає просту та зрозумілу можливість зручно згущувати сітку вузлів в сторону найбільшої похибки, завдяки чому можна зробити розв’язок максимально точним.  Варто зауважити, що дана схема є досить простою, адже вимагає простого поділу одного скінченного елемента на два</a:t>
-            </a:r>
-            <a:r>
-              <a:rPr lang="uk-UA" dirty="0" smtClean="0"/>
-              <a:t>.</a:t>
-            </a:r>
-          </a:p>
-          <a:p>
-            <a:r>
-              <a:rPr lang="uk-UA" dirty="0" smtClean="0"/>
-              <a:t>	Як </a:t>
-            </a:r>
-            <a:r>
-              <a:rPr lang="uk-UA" dirty="0"/>
-              <a:t>можна бачити з результатів </a:t>
-            </a:r>
-            <a:r>
-              <a:rPr lang="en-US" dirty="0"/>
-              <a:t>h-</a:t>
-            </a:r>
-            <a:r>
-              <a:rPr lang="uk-UA" dirty="0"/>
-              <a:t>адаптивна схема методу скінченних елементів дає чудову апроксимацію розв’язку задачі конвекції-дифузії-реакції з використанням </a:t>
-            </a:r>
-            <a:r>
-              <a:rPr lang="uk-UA" dirty="0" err="1"/>
-              <a:t>нерівновіддалених</a:t>
-            </a:r>
-            <a:r>
-              <a:rPr lang="uk-UA" dirty="0"/>
-              <a:t> вузлів.</a:t>
-            </a:r>
-          </a:p>
-          <a:p>
             <a:endParaRPr lang="uk-UA" dirty="0"/>
           </a:p>
         </p:txBody>
       </p:sp>
+      <p:pic>
+        <p:nvPicPr>
+          <p:cNvPr id="6" name="Рисунок 5"/>
+          <p:cNvPicPr/>
+          <p:nvPr/>
+        </p:nvPicPr>
+        <p:blipFill>
+          <a:blip r:embed="rId2"/>
+          <a:stretch>
+            <a:fillRect/>
+          </a:stretch>
+        </p:blipFill>
+        <p:spPr>
+          <a:xfrm>
+            <a:off x="1312670" y="339503"/>
+            <a:ext cx="6520238" cy="4349893"/>
+          </a:xfrm>
+          <a:prstGeom prst="rect">
+            <a:avLst/>
+          </a:prstGeom>
+        </p:spPr>
+      </p:pic>
     </p:spTree>
     <p:extLst>
       <p:ext uri="{BB962C8B-B14F-4D97-AF65-F5344CB8AC3E}">
-        <p14:creationId xmlns:p14="http://schemas.microsoft.com/office/powerpoint/2010/main" val="3573946438"/>
+        <p14:creationId xmlns:p14="http://schemas.microsoft.com/office/powerpoint/2010/main" val="3261424969"/>
+      </p:ext>
+    </p:extLst>
+  </p:cSld>
+  <p:clrMapOvr>
+    <a:masterClrMapping/>
+  </p:clrMapOvr>
+  <p:timing>
+    <p:tnLst>
+      <p:par>
+        <p:cTn id="1" dur="indefinite" restart="never" nodeType="tmRoot"/>
+      </p:par>
+    </p:tnLst>
+  </p:timing>
+</p:sld>
+</file>
+
+<file path=ppt/slides/slide18.xml><?xml version="1.0" encoding="utf-8"?>
+<p:sld xmlns:a="http://schemas.openxmlformats.org/drawingml/2006/main" xmlns:r="http://schemas.openxmlformats.org/officeDocument/2006/relationships" xmlns:p="http://schemas.openxmlformats.org/presentationml/2006/main">
+  <p:cSld>
+    <p:spTree>
+      <p:nvGrpSpPr>
+        <p:cNvPr id="1" name=""/>
+        <p:cNvGrpSpPr/>
+        <p:nvPr/>
+      </p:nvGrpSpPr>
+      <p:grpSpPr>
+        <a:xfrm>
+          <a:off x="0" y="0"/>
+          <a:ext cx="0" cy="0"/>
+          <a:chOff x="0" y="0"/>
+          <a:chExt cx="0" cy="0"/>
+        </a:xfrm>
+      </p:grpSpPr>
+      <p:sp>
+        <p:nvSpPr>
+          <p:cNvPr id="2" name="Заголовок 1"/>
+          <p:cNvSpPr txBox="1">
+            <a:spLocks/>
+          </p:cNvSpPr>
+          <p:nvPr/>
+        </p:nvSpPr>
+        <p:spPr>
+          <a:xfrm>
+            <a:off x="467544" y="1"/>
+            <a:ext cx="8219256" cy="339502"/>
+          </a:xfrm>
+          <a:prstGeom prst="rect">
+            <a:avLst/>
+          </a:prstGeom>
+        </p:spPr>
+        <p:txBody>
+          <a:bodyPr vert="horz" lIns="91440" tIns="45720" rIns="91440" bIns="45720" rtlCol="0" anchor="ctr">
+            <a:noAutofit/>
+          </a:bodyPr>
+          <a:lstStyle>
+            <a:lvl1pPr algn="ctr" defTabSz="914400" rtl="0" eaLnBrk="1" latinLnBrk="0" hangingPunct="1">
+              <a:spcBef>
+                <a:spcPct val="0"/>
+              </a:spcBef>
+              <a:buNone/>
+              <a:defRPr sz="4400" kern="1200">
+                <a:solidFill>
+                  <a:schemeClr val="tx1"/>
+                </a:solidFill>
+                <a:latin typeface="+mj-lt"/>
+                <a:ea typeface="+mj-ea"/>
+                <a:cs typeface="+mj-cs"/>
+              </a:defRPr>
+            </a:lvl1pPr>
+          </a:lstStyle>
+          <a:p>
+            <a:r>
+              <a:rPr lang="uk-UA" sz="2400" b="1" dirty="0" smtClean="0">
+                <a:solidFill>
+                  <a:srgbClr val="009999"/>
+                </a:solidFill>
+              </a:rPr>
+              <a:t>Аналіз результатів</a:t>
+            </a:r>
+            <a:endParaRPr lang="uk-UA" sz="2400" b="1" dirty="0">
+              <a:solidFill>
+                <a:srgbClr val="009999"/>
+              </a:solidFill>
+            </a:endParaRPr>
+          </a:p>
+        </p:txBody>
+      </p:sp>
+      <p:sp>
+        <p:nvSpPr>
+          <p:cNvPr id="3" name="Прямокутник 2"/>
+          <p:cNvSpPr/>
+          <p:nvPr/>
+        </p:nvSpPr>
+        <p:spPr>
+          <a:xfrm>
+            <a:off x="3761733" y="4659981"/>
+            <a:ext cx="1973169" cy="369332"/>
+          </a:xfrm>
+          <a:prstGeom prst="rect">
+            <a:avLst/>
+          </a:prstGeom>
+        </p:spPr>
+        <p:txBody>
+          <a:bodyPr wrap="none">
+            <a:spAutoFit/>
+          </a:bodyPr>
+          <a:lstStyle/>
+          <a:p>
+            <a:r>
+              <a:rPr lang="en-US" dirty="0" smtClean="0"/>
+              <a:t>N=</a:t>
+            </a:r>
+            <a:r>
+              <a:rPr lang="uk-UA" dirty="0" smtClean="0"/>
+              <a:t>269</a:t>
+            </a:r>
+            <a:r>
+              <a:rPr lang="en-US" dirty="0" smtClean="0"/>
+              <a:t>, </a:t>
+            </a:r>
+            <a:r>
+              <a:rPr lang="uk-UA" dirty="0"/>
+              <a:t>ітерація </a:t>
+            </a:r>
+            <a:r>
+              <a:rPr lang="uk-UA" dirty="0" smtClean="0"/>
+              <a:t>18</a:t>
+            </a:r>
+            <a:endParaRPr lang="uk-UA" dirty="0"/>
+          </a:p>
+        </p:txBody>
+      </p:sp>
+      <p:pic>
+        <p:nvPicPr>
+          <p:cNvPr id="6" name="Рисунок 5"/>
+          <p:cNvPicPr/>
+          <p:nvPr/>
+        </p:nvPicPr>
+        <p:blipFill>
+          <a:blip r:embed="rId2"/>
+          <a:stretch>
+            <a:fillRect/>
+          </a:stretch>
+        </p:blipFill>
+        <p:spPr>
+          <a:xfrm>
+            <a:off x="1312669" y="339502"/>
+            <a:ext cx="6523527" cy="4349894"/>
+          </a:xfrm>
+          <a:prstGeom prst="rect">
+            <a:avLst/>
+          </a:prstGeom>
+        </p:spPr>
+      </p:pic>
+    </p:spTree>
+    <p:extLst>
+      <p:ext uri="{BB962C8B-B14F-4D97-AF65-F5344CB8AC3E}">
+        <p14:creationId xmlns:p14="http://schemas.microsoft.com/office/powerpoint/2010/main" val="3488504395"/>
+      </p:ext>
+    </p:extLst>
+  </p:cSld>
+  <p:clrMapOvr>
+    <a:masterClrMapping/>
+  </p:clrMapOvr>
+  <p:timing>
+    <p:tnLst>
+      <p:par>
+        <p:cTn id="1" dur="indefinite" restart="never" nodeType="tmRoot"/>
+      </p:par>
+    </p:tnLst>
+  </p:timing>
+</p:sld>
+</file>
+
+<file path=ppt/slides/slide19.xml><?xml version="1.0" encoding="utf-8"?>
+<p:sld xmlns:a="http://schemas.openxmlformats.org/drawingml/2006/main" xmlns:r="http://schemas.openxmlformats.org/officeDocument/2006/relationships" xmlns:p="http://schemas.openxmlformats.org/presentationml/2006/main">
+  <p:cSld>
+    <p:spTree>
+      <p:nvGrpSpPr>
+        <p:cNvPr id="1" name=""/>
+        <p:cNvGrpSpPr/>
+        <p:nvPr/>
+      </p:nvGrpSpPr>
+      <p:grpSpPr>
+        <a:xfrm>
+          <a:off x="0" y="0"/>
+          <a:ext cx="0" cy="0"/>
+          <a:chOff x="0" y="0"/>
+          <a:chExt cx="0" cy="0"/>
+        </a:xfrm>
+      </p:grpSpPr>
+      <p:sp>
+        <p:nvSpPr>
+          <p:cNvPr id="2" name="Заголовок 1"/>
+          <p:cNvSpPr txBox="1">
+            <a:spLocks/>
+          </p:cNvSpPr>
+          <p:nvPr/>
+        </p:nvSpPr>
+        <p:spPr>
+          <a:xfrm>
+            <a:off x="467544" y="1"/>
+            <a:ext cx="8219256" cy="339502"/>
+          </a:xfrm>
+          <a:prstGeom prst="rect">
+            <a:avLst/>
+          </a:prstGeom>
+        </p:spPr>
+        <p:txBody>
+          <a:bodyPr vert="horz" lIns="91440" tIns="45720" rIns="91440" bIns="45720" rtlCol="0" anchor="ctr">
+            <a:noAutofit/>
+          </a:bodyPr>
+          <a:lstStyle>
+            <a:lvl1pPr algn="ctr" defTabSz="914400" rtl="0" eaLnBrk="1" latinLnBrk="0" hangingPunct="1">
+              <a:spcBef>
+                <a:spcPct val="0"/>
+              </a:spcBef>
+              <a:buNone/>
+              <a:defRPr sz="4400" kern="1200">
+                <a:solidFill>
+                  <a:schemeClr val="tx1"/>
+                </a:solidFill>
+                <a:latin typeface="+mj-lt"/>
+                <a:ea typeface="+mj-ea"/>
+                <a:cs typeface="+mj-cs"/>
+              </a:defRPr>
+            </a:lvl1pPr>
+          </a:lstStyle>
+          <a:p>
+            <a:r>
+              <a:rPr lang="uk-UA" sz="2400" b="1" dirty="0" smtClean="0">
+                <a:solidFill>
+                  <a:srgbClr val="009999"/>
+                </a:solidFill>
+              </a:rPr>
+              <a:t>Норми, похибки, порядок збіжності</a:t>
+            </a:r>
+            <a:endParaRPr lang="uk-UA" sz="2400" b="1" dirty="0">
+              <a:solidFill>
+                <a:srgbClr val="009999"/>
+              </a:solidFill>
+            </a:endParaRPr>
+          </a:p>
+        </p:txBody>
+      </p:sp>
+      <p:pic>
+        <p:nvPicPr>
+          <p:cNvPr id="3" name="Рисунок 2"/>
+          <p:cNvPicPr/>
+          <p:nvPr/>
+        </p:nvPicPr>
+        <p:blipFill>
+          <a:blip r:embed="rId2"/>
+          <a:stretch>
+            <a:fillRect/>
+          </a:stretch>
+        </p:blipFill>
+        <p:spPr>
+          <a:xfrm>
+            <a:off x="245270" y="627534"/>
+            <a:ext cx="8663804" cy="3816424"/>
+          </a:xfrm>
+          <a:prstGeom prst="rect">
+            <a:avLst/>
+          </a:prstGeom>
+        </p:spPr>
+      </p:pic>
+    </p:spTree>
+    <p:extLst>
+      <p:ext uri="{BB962C8B-B14F-4D97-AF65-F5344CB8AC3E}">
+        <p14:creationId xmlns:p14="http://schemas.microsoft.com/office/powerpoint/2010/main" val="4235736490"/>
       </p:ext>
     </p:extLst>
   </p:cSld>
@@ -6291,6 +6545,184 @@
     <p:extLst>
       <p:ext uri="{BB962C8B-B14F-4D97-AF65-F5344CB8AC3E}">
         <p14:creationId xmlns:p14="http://schemas.microsoft.com/office/powerpoint/2010/main" val="4117674993"/>
+      </p:ext>
+    </p:extLst>
+  </p:cSld>
+  <p:clrMapOvr>
+    <a:masterClrMapping/>
+  </p:clrMapOvr>
+  <p:timing>
+    <p:tnLst>
+      <p:par>
+        <p:cTn id="1" dur="indefinite" restart="never" nodeType="tmRoot"/>
+      </p:par>
+    </p:tnLst>
+  </p:timing>
+</p:sld>
+</file>
+
+<file path=ppt/slides/slide20.xml><?xml version="1.0" encoding="utf-8"?>
+<p:sld xmlns:a="http://schemas.openxmlformats.org/drawingml/2006/main" xmlns:r="http://schemas.openxmlformats.org/officeDocument/2006/relationships" xmlns:p="http://schemas.openxmlformats.org/presentationml/2006/main">
+  <p:cSld>
+    <p:spTree>
+      <p:nvGrpSpPr>
+        <p:cNvPr id="1" name=""/>
+        <p:cNvGrpSpPr/>
+        <p:nvPr/>
+      </p:nvGrpSpPr>
+      <p:grpSpPr>
+        <a:xfrm>
+          <a:off x="0" y="0"/>
+          <a:ext cx="0" cy="0"/>
+          <a:chOff x="0" y="0"/>
+          <a:chExt cx="0" cy="0"/>
+        </a:xfrm>
+      </p:grpSpPr>
+      <p:sp>
+        <p:nvSpPr>
+          <p:cNvPr id="2" name="Заголовок 1"/>
+          <p:cNvSpPr txBox="1">
+            <a:spLocks/>
+          </p:cNvSpPr>
+          <p:nvPr/>
+        </p:nvSpPr>
+        <p:spPr>
+          <a:xfrm>
+            <a:off x="467544" y="1"/>
+            <a:ext cx="8219256" cy="339502"/>
+          </a:xfrm>
+          <a:prstGeom prst="rect">
+            <a:avLst/>
+          </a:prstGeom>
+        </p:spPr>
+        <p:txBody>
+          <a:bodyPr vert="horz" lIns="91440" tIns="45720" rIns="91440" bIns="45720" rtlCol="0" anchor="ctr">
+            <a:noAutofit/>
+          </a:bodyPr>
+          <a:lstStyle>
+            <a:lvl1pPr algn="ctr" defTabSz="914400" rtl="0" eaLnBrk="1" latinLnBrk="0" hangingPunct="1">
+              <a:spcBef>
+                <a:spcPct val="0"/>
+              </a:spcBef>
+              <a:buNone/>
+              <a:defRPr sz="4400" kern="1200">
+                <a:solidFill>
+                  <a:schemeClr val="tx1"/>
+                </a:solidFill>
+                <a:latin typeface="+mj-lt"/>
+                <a:ea typeface="+mj-ea"/>
+                <a:cs typeface="+mj-cs"/>
+              </a:defRPr>
+            </a:lvl1pPr>
+          </a:lstStyle>
+          <a:p>
+            <a:r>
+              <a:rPr lang="uk-UA" sz="2400" b="1" dirty="0" smtClean="0">
+                <a:solidFill>
+                  <a:srgbClr val="009999"/>
+                </a:solidFill>
+              </a:rPr>
+              <a:t>Висновки</a:t>
+            </a:r>
+            <a:endParaRPr lang="uk-UA" sz="2400" b="1" dirty="0">
+              <a:solidFill>
+                <a:srgbClr val="009999"/>
+              </a:solidFill>
+            </a:endParaRPr>
+          </a:p>
+        </p:txBody>
+      </p:sp>
+      <p:sp>
+        <p:nvSpPr>
+          <p:cNvPr id="3" name="Прямокутник 2"/>
+          <p:cNvSpPr/>
+          <p:nvPr/>
+        </p:nvSpPr>
+        <p:spPr>
+          <a:xfrm>
+            <a:off x="447997" y="483518"/>
+            <a:ext cx="8219256" cy="4247317"/>
+          </a:xfrm>
+          <a:prstGeom prst="rect">
+            <a:avLst/>
+          </a:prstGeom>
+        </p:spPr>
+        <p:txBody>
+          <a:bodyPr wrap="square">
+            <a:spAutoFit/>
+          </a:bodyPr>
+          <a:lstStyle/>
+          <a:p>
+            <a:r>
+              <a:rPr lang="uk-UA" dirty="0" smtClean="0"/>
+              <a:t>	Як можна бачити з </a:t>
+            </a:r>
+            <a:r>
+              <a:rPr lang="uk-UA" dirty="0"/>
+              <a:t>використанням методу скінченних елементів можна досить швидко і просто отримати розв’язок стаціонарної крайової задачі конвекції-дифузії-реакції. </a:t>
+            </a:r>
+          </a:p>
+          <a:p>
+            <a:r>
+              <a:rPr lang="uk-UA" dirty="0"/>
+              <a:t>	Таким чином застосувавши </a:t>
+            </a:r>
+            <a:r>
+              <a:rPr lang="uk-UA" dirty="0" smtClean="0"/>
+              <a:t>метод Гальоркіна </a:t>
+            </a:r>
+            <a:r>
+              <a:rPr lang="uk-UA" dirty="0"/>
+              <a:t>та з допомогою кусково-лінійний функції Куранта вдалося побудувати наближеним розв’язок даної задачі. При цьому використовуючи </a:t>
+            </a:r>
+            <a:r>
+              <a:rPr lang="en-US" dirty="0"/>
+              <a:t>h-</a:t>
+            </a:r>
+            <a:r>
+              <a:rPr lang="uk-UA" dirty="0"/>
+              <a:t>адаптивну схему можна досить швидко та з великою точність знайти наближений розв’язок задачі. Такий підхід дає просту та зрозумілу можливість зручно згущувати сітку вузлів в сторону найбільшої похибки, завдяки чому можна зробити розв’язок максимально точним.  Варто зауважити, що дана схема є досить простою, адже вимагає простого поділу одного скінченного елемента на два</a:t>
+            </a:r>
+            <a:r>
+              <a:rPr lang="uk-UA" dirty="0" smtClean="0"/>
+              <a:t>.</a:t>
+            </a:r>
+          </a:p>
+          <a:p>
+            <a:r>
+              <a:rPr lang="uk-UA" dirty="0" smtClean="0"/>
+              <a:t>	Як </a:t>
+            </a:r>
+            <a:r>
+              <a:rPr lang="uk-UA" dirty="0"/>
+              <a:t>можна бачити з результатів </a:t>
+            </a:r>
+            <a:r>
+              <a:rPr lang="en-US" dirty="0"/>
+              <a:t>h-</a:t>
+            </a:r>
+            <a:r>
+              <a:rPr lang="uk-UA" dirty="0"/>
+              <a:t>адаптивна схема методу скінченних елементів дає чудову апроксимацію розв’язку задачі конвекції-дифузії-реакції з використанням </a:t>
+            </a:r>
+            <a:r>
+              <a:rPr lang="uk-UA" dirty="0" err="1"/>
+              <a:t>нерівновіддалених</a:t>
+            </a:r>
+            <a:r>
+              <a:rPr lang="uk-UA" dirty="0"/>
+              <a:t> вузлів.</a:t>
+            </a:r>
+          </a:p>
+          <a:p>
+            <a:endParaRPr lang="uk-UA" dirty="0"/>
+          </a:p>
+        </p:txBody>
+      </p:sp>
+    </p:spTree>
+    <p:extLst>
+      <p:ext uri="{BB962C8B-B14F-4D97-AF65-F5344CB8AC3E}">
+        <p14:creationId xmlns:p14="http://schemas.microsoft.com/office/powerpoint/2010/main" val="3573946438"/>
       </p:ext>
     </p:extLst>
   </p:cSld>
@@ -13023,7 +13455,6 @@
               <a:rPr lang="uk-UA" dirty="0"/>
               <a:t>Ітераційний процес завершується тоді, коли на всіх скінченних елементах значення індикаторі не перевищує початкову задану похибку.</a:t>
             </a:r>
-            <a:endParaRPr lang="uk-UA" dirty="0"/>
           </a:p>
         </p:txBody>
       </p:sp>
@@ -13099,6 +13530,13 @@
   <p:clrMapOvr>
     <a:masterClrMapping/>
   </p:clrMapOvr>
+  <p:timing>
+    <p:tnLst>
+      <p:par>
+        <p:cTn id="1" dur="indefinite" restart="never" nodeType="tmRoot"/>
+      </p:par>
+    </p:tnLst>
+  </p:timing>
 </p:sld>
 </file>
 
@@ -16014,6 +16452,13 @@
   <p:clrMapOvr>
     <a:masterClrMapping/>
   </p:clrMapOvr>
+  <p:timing>
+    <p:tnLst>
+      <p:par>
+        <p:cTn id="1" dur="indefinite" restart="never" nodeType="tmRoot"/>
+      </p:par>
+    </p:tnLst>
+  </p:timing>
 </p:sld>
 </file>
 
@@ -17216,6 +17661,13 @@
   <p:clrMapOvr>
     <a:masterClrMapping/>
   </p:clrMapOvr>
+  <p:timing>
+    <p:tnLst>
+      <p:par>
+        <p:cTn id="1" dur="indefinite" restart="never" nodeType="tmRoot"/>
+      </p:par>
+    </p:tnLst>
+  </p:timing>
 </p:sld>
 </file>
 

</xml_diff>